<commit_message>
added a sub header to chap2
</commit_message>
<xml_diff>
--- a/Notebooks/figures/chap03/1/figure.pptx
+++ b/Notebooks/figures/chap03/1/figure.pptx
@@ -289,7 +289,7 @@
           <a:p>
             <a:fld id="{46B215DF-9304-D749-9E36-45FCEA760741}" type="datetimeFigureOut">
               <a:rPr lang="en-US" smtClean="0"/>
-              <a:t>4/29/13</a:t>
+              <a:t>5/10/17</a:t>
             </a:fld>
             <a:endParaRPr lang="en-US"/>
           </a:p>
@@ -459,7 +459,7 @@
           <a:p>
             <a:fld id="{46B215DF-9304-D749-9E36-45FCEA760741}" type="datetimeFigureOut">
               <a:rPr lang="en-US" smtClean="0"/>
-              <a:t>4/29/13</a:t>
+              <a:t>5/10/17</a:t>
             </a:fld>
             <a:endParaRPr lang="en-US"/>
           </a:p>
@@ -639,7 +639,7 @@
           <a:p>
             <a:fld id="{46B215DF-9304-D749-9E36-45FCEA760741}" type="datetimeFigureOut">
               <a:rPr lang="en-US" smtClean="0"/>
-              <a:t>4/29/13</a:t>
+              <a:t>5/10/17</a:t>
             </a:fld>
             <a:endParaRPr lang="en-US"/>
           </a:p>
@@ -5067,7 +5067,7 @@
           <a:p>
             <a:fld id="{46B215DF-9304-D749-9E36-45FCEA760741}" type="datetimeFigureOut">
               <a:rPr lang="en-US" smtClean="0"/>
-              <a:t>4/29/13</a:t>
+              <a:t>5/10/17</a:t>
             </a:fld>
             <a:endParaRPr lang="en-US"/>
           </a:p>
@@ -5991,7 +5991,7 @@
           <a:p>
             <a:fld id="{46B215DF-9304-D749-9E36-45FCEA760741}" type="datetimeFigureOut">
               <a:rPr lang="en-US" smtClean="0"/>
-              <a:t>4/29/13</a:t>
+              <a:t>5/10/17</a:t>
             </a:fld>
             <a:endParaRPr lang="en-US"/>
           </a:p>
@@ -6279,7 +6279,7 @@
           <a:p>
             <a:fld id="{46B215DF-9304-D749-9E36-45FCEA760741}" type="datetimeFigureOut">
               <a:rPr lang="en-US" smtClean="0"/>
-              <a:t>4/29/13</a:t>
+              <a:t>5/10/17</a:t>
             </a:fld>
             <a:endParaRPr lang="en-US"/>
           </a:p>
@@ -6701,7 +6701,7 @@
           <a:p>
             <a:fld id="{46B215DF-9304-D749-9E36-45FCEA760741}" type="datetimeFigureOut">
               <a:rPr lang="en-US" smtClean="0"/>
-              <a:t>4/29/13</a:t>
+              <a:t>5/10/17</a:t>
             </a:fld>
             <a:endParaRPr lang="en-US"/>
           </a:p>
@@ -6819,7 +6819,7 @@
           <a:p>
             <a:fld id="{46B215DF-9304-D749-9E36-45FCEA760741}" type="datetimeFigureOut">
               <a:rPr lang="en-US" smtClean="0"/>
-              <a:t>4/29/13</a:t>
+              <a:t>5/10/17</a:t>
             </a:fld>
             <a:endParaRPr lang="en-US"/>
           </a:p>
@@ -6914,7 +6914,7 @@
           <a:p>
             <a:fld id="{46B215DF-9304-D749-9E36-45FCEA760741}" type="datetimeFigureOut">
               <a:rPr lang="en-US" smtClean="0"/>
-              <a:t>4/29/13</a:t>
+              <a:t>5/10/17</a:t>
             </a:fld>
             <a:endParaRPr lang="en-US"/>
           </a:p>
@@ -7191,7 +7191,7 @@
           <a:p>
             <a:fld id="{46B215DF-9304-D749-9E36-45FCEA760741}" type="datetimeFigureOut">
               <a:rPr lang="en-US" smtClean="0"/>
-              <a:t>4/29/13</a:t>
+              <a:t>5/10/17</a:t>
             </a:fld>
             <a:endParaRPr lang="en-US"/>
           </a:p>
@@ -7447,7 +7447,7 @@
           <a:p>
             <a:fld id="{46B215DF-9304-D749-9E36-45FCEA760741}" type="datetimeFigureOut">
               <a:rPr lang="en-US" smtClean="0"/>
-              <a:t>4/29/13</a:t>
+              <a:t>5/10/17</a:t>
             </a:fld>
             <a:endParaRPr lang="en-US"/>
           </a:p>
@@ -7660,7 +7660,7 @@
           <a:p>
             <a:fld id="{46B215DF-9304-D749-9E36-45FCEA760741}" type="datetimeFigureOut">
               <a:rPr lang="en-US" smtClean="0"/>
-              <a:t>4/29/13</a:t>
+              <a:t>5/10/17</a:t>
             </a:fld>
             <a:endParaRPr lang="en-US"/>
           </a:p>
@@ -11366,8 +11366,8 @@
         </p:nvSpPr>
         <p:spPr>
           <a:xfrm>
-            <a:off x="4983517" y="3764437"/>
-            <a:ext cx="720670" cy="338554"/>
+            <a:off x="5067062" y="3764437"/>
+            <a:ext cx="304490" cy="338554"/>
           </a:xfrm>
           <a:prstGeom prst="rect">
             <a:avLst/>
@@ -11381,12 +11381,16 @@
           <a:lstStyle/>
           <a:p>
             <a:r>
-              <a:rPr lang="en-US" sz="1600">
+              <a:rPr lang="en-US" sz="1600" dirty="0">
                 <a:latin typeface="Arial"/>
                 <a:cs typeface="Arial"/>
               </a:rPr>
-              <a:t>PLUS</a:t>
-            </a:r>
+              <a:t>+</a:t>
+            </a:r>
+            <a:endParaRPr lang="en-US" sz="1600" dirty="0">
+              <a:latin typeface="Arial"/>
+              <a:cs typeface="Arial"/>
+            </a:endParaRPr>
           </a:p>
         </p:txBody>
       </p:sp>
@@ -11413,12 +11417,16 @@
           <a:lstStyle/>
           <a:p>
             <a:r>
-              <a:rPr lang="en-US" sz="1600">
+              <a:rPr lang="en-US" sz="1600" dirty="0" err="1">
                 <a:latin typeface="Arial"/>
                 <a:cs typeface="Arial"/>
               </a:rPr>
               <a:t>exp</a:t>
             </a:r>
+            <a:endParaRPr lang="en-US" sz="1600" dirty="0">
+              <a:latin typeface="Arial"/>
+              <a:cs typeface="Arial"/>
+            </a:endParaRPr>
           </a:p>
         </p:txBody>
       </p:sp>
@@ -11462,8 +11470,8 @@
         </p:nvSpPr>
         <p:spPr>
           <a:xfrm>
-            <a:off x="5413188" y="4611058"/>
-            <a:ext cx="1138553" cy="338554"/>
+            <a:off x="5830913" y="5246114"/>
+            <a:ext cx="298780" cy="338554"/>
           </a:xfrm>
           <a:prstGeom prst="rect">
             <a:avLst/>
@@ -11477,12 +11485,16 @@
           <a:lstStyle/>
           <a:p>
             <a:r>
-              <a:rPr lang="en-US" sz="1600">
+              <a:rPr lang="en-US" sz="1600" dirty="0" smtClean="0">
                 <a:latin typeface="Arial"/>
                 <a:cs typeface="Arial"/>
               </a:rPr>
-              <a:t>INTVAL(2)</a:t>
-            </a:r>
+              <a:t>2 </a:t>
+            </a:r>
+            <a:endParaRPr lang="en-US" sz="1600" dirty="0">
+              <a:latin typeface="Arial"/>
+              <a:cs typeface="Arial"/>
+            </a:endParaRPr>
           </a:p>
         </p:txBody>
       </p:sp>
@@ -11494,8 +11506,8 @@
         </p:nvSpPr>
         <p:spPr>
           <a:xfrm>
-            <a:off x="6218607" y="5222283"/>
-            <a:ext cx="1016725" cy="338554"/>
+            <a:off x="6586205" y="5222283"/>
+            <a:ext cx="287258" cy="338554"/>
           </a:xfrm>
           <a:prstGeom prst="rect">
             <a:avLst/>
@@ -11509,12 +11521,16 @@
           <a:lstStyle/>
           <a:p>
             <a:r>
-              <a:rPr lang="en-US" sz="1600">
+              <a:rPr lang="en-US" sz="1600" dirty="0" smtClean="0">
                 <a:latin typeface="Arial"/>
                 <a:cs typeface="Arial"/>
               </a:rPr>
-              <a:t>NAME(x)</a:t>
-            </a:r>
+              <a:t>x</a:t>
+            </a:r>
+            <a:endParaRPr lang="en-US" sz="1600" dirty="0">
+              <a:latin typeface="Arial"/>
+              <a:cs typeface="Arial"/>
+            </a:endParaRPr>
           </a:p>
         </p:txBody>
       </p:sp>
@@ -11558,8 +11574,8 @@
         </p:nvSpPr>
         <p:spPr>
           <a:xfrm>
-            <a:off x="3446456" y="3742832"/>
-            <a:ext cx="1016725" cy="338554"/>
+            <a:off x="3814054" y="3742832"/>
+            <a:ext cx="300082" cy="338554"/>
           </a:xfrm>
           <a:prstGeom prst="rect">
             <a:avLst/>
@@ -11573,12 +11589,16 @@
           <a:lstStyle/>
           <a:p>
             <a:r>
-              <a:rPr lang="en-US" sz="1600">
+              <a:rPr lang="en-US" sz="1600" dirty="0" smtClean="0">
                 <a:latin typeface="Arial"/>
                 <a:cs typeface="Arial"/>
               </a:rPr>
-              <a:t>NAME(y)</a:t>
-            </a:r>
+              <a:t>y</a:t>
+            </a:r>
+            <a:endParaRPr lang="en-US" sz="1600" dirty="0">
+              <a:latin typeface="Arial"/>
+              <a:cs typeface="Arial"/>
+            </a:endParaRPr>
           </a:p>
         </p:txBody>
       </p:sp>
@@ -11658,9 +11678,9 @@
           <p:nvPr/>
         </p:nvCxnSpPr>
         <p:spPr>
-          <a:xfrm flipH="1">
-            <a:off x="3954819" y="3184027"/>
-            <a:ext cx="3800" cy="558805"/>
+          <a:xfrm>
+            <a:off x="3958619" y="3184027"/>
+            <a:ext cx="5476" cy="558805"/>
           </a:xfrm>
           <a:prstGeom prst="line">
             <a:avLst/>
@@ -11725,8 +11745,8 @@
         </p:nvCxnSpPr>
         <p:spPr>
           <a:xfrm flipH="1">
-            <a:off x="5343852" y="3214263"/>
-            <a:ext cx="628130" cy="550174"/>
+            <a:off x="5219307" y="3214263"/>
+            <a:ext cx="752675" cy="550174"/>
           </a:xfrm>
           <a:prstGeom prst="line">
             <a:avLst/>
@@ -11815,39 +11835,6 @@
       </p:cxnSp>
       <p:cxnSp>
         <p:nvCxnSpPr>
-          <p:cNvPr id="37" name="Straight Connector 36"/>
-          <p:cNvCxnSpPr>
-            <a:stCxn id="9" idx="2"/>
-            <a:endCxn id="11" idx="0"/>
-          </p:cNvCxnSpPr>
-          <p:nvPr/>
-        </p:nvCxnSpPr>
-        <p:spPr>
-          <a:xfrm>
-            <a:off x="5971982" y="4111612"/>
-            <a:ext cx="10483" cy="499446"/>
-          </a:xfrm>
-          <a:prstGeom prst="line">
-            <a:avLst/>
-          </a:prstGeom>
-        </p:spPr>
-        <p:style>
-          <a:lnRef idx="2">
-            <a:schemeClr val="accent1"/>
-          </a:lnRef>
-          <a:fillRef idx="0">
-            <a:schemeClr val="accent1"/>
-          </a:fillRef>
-          <a:effectRef idx="1">
-            <a:schemeClr val="accent1"/>
-          </a:effectRef>
-          <a:fontRef idx="minor">
-            <a:schemeClr val="tx1"/>
-          </a:fontRef>
-        </p:style>
-      </p:cxnSp>
-      <p:cxnSp>
-        <p:nvCxnSpPr>
           <p:cNvPr id="39" name="Straight Connector 38"/>
           <p:cNvCxnSpPr>
             <a:stCxn id="10" idx="2"/>
@@ -11889,9 +11876,9 @@
           <p:nvPr/>
         </p:nvCxnSpPr>
         <p:spPr>
-          <a:xfrm flipH="1">
-            <a:off x="6726970" y="4919377"/>
-            <a:ext cx="1546" cy="302906"/>
+          <a:xfrm>
+            <a:off x="6728516" y="4919377"/>
+            <a:ext cx="1318" cy="302906"/>
           </a:xfrm>
           <a:prstGeom prst="line">
             <a:avLst/>
@@ -11966,7 +11953,7 @@
         </p:nvSpPr>
         <p:spPr>
           <a:xfrm>
-            <a:off x="5590785" y="4207448"/>
+            <a:off x="5590785" y="4859216"/>
             <a:ext cx="226804" cy="403610"/>
           </a:xfrm>
           <a:prstGeom prst="upArrow">
@@ -12104,8 +12091,8 @@
         </p:nvSpPr>
         <p:spPr>
           <a:xfrm>
-            <a:off x="7151903" y="2827108"/>
-            <a:ext cx="749011" cy="369332"/>
+            <a:off x="7235448" y="2827108"/>
+            <a:ext cx="248799" cy="369332"/>
           </a:xfrm>
           <a:prstGeom prst="rect">
             <a:avLst/>
@@ -12119,12 +12106,16 @@
           <a:lstStyle/>
           <a:p>
             <a:r>
-              <a:rPr lang="en-US">
+              <a:rPr lang="en-US" dirty="0">
                 <a:latin typeface="Arial"/>
                 <a:cs typeface="Arial"/>
               </a:rPr>
-              <a:t>SEMI</a:t>
-            </a:r>
+              <a:t>;</a:t>
+            </a:r>
+            <a:endParaRPr lang="en-US" dirty="0">
+              <a:latin typeface="Arial"/>
+              <a:cs typeface="Arial"/>
+            </a:endParaRPr>
           </a:p>
         </p:txBody>
       </p:sp>
@@ -12140,7 +12131,103 @@
         <p:spPr>
           <a:xfrm>
             <a:off x="3924779" y="1738053"/>
-            <a:ext cx="3601630" cy="1089055"/>
+            <a:ext cx="3435069" cy="1089055"/>
+          </a:xfrm>
+          <a:prstGeom prst="line">
+            <a:avLst/>
+          </a:prstGeom>
+        </p:spPr>
+        <p:style>
+          <a:lnRef idx="2">
+            <a:schemeClr val="accent1"/>
+          </a:lnRef>
+          <a:fillRef idx="0">
+            <a:schemeClr val="accent1"/>
+          </a:fillRef>
+          <a:effectRef idx="1">
+            <a:schemeClr val="accent1"/>
+          </a:effectRef>
+          <a:fontRef idx="minor">
+            <a:schemeClr val="tx1"/>
+          </a:fontRef>
+        </p:style>
+      </p:cxnSp>
+      <p:sp>
+        <p:nvSpPr>
+          <p:cNvPr id="2" name="TextBox 1"/>
+          <p:cNvSpPr txBox="1"/>
+          <p:nvPr/>
+        </p:nvSpPr>
+        <p:spPr>
+          <a:xfrm>
+            <a:off x="5681060" y="4562247"/>
+            <a:ext cx="611616" cy="369332"/>
+          </a:xfrm>
+          <a:prstGeom prst="rect">
+            <a:avLst/>
+          </a:prstGeom>
+          <a:noFill/>
+        </p:spPr>
+        <p:txBody>
+          <a:bodyPr wrap="none" rtlCol="0">
+            <a:spAutoFit/>
+          </a:bodyPr>
+          <a:lstStyle/>
+          <a:p>
+            <a:r>
+              <a:rPr lang="en-US" dirty="0" err="1" smtClean="0"/>
+              <a:t>num</a:t>
+            </a:r>
+            <a:endParaRPr lang="en-US" dirty="0"/>
+          </a:p>
+        </p:txBody>
+      </p:sp>
+      <p:cxnSp>
+        <p:nvCxnSpPr>
+          <p:cNvPr id="15" name="Straight Connector 14"/>
+          <p:cNvCxnSpPr>
+            <a:stCxn id="9" idx="2"/>
+            <a:endCxn id="2" idx="0"/>
+          </p:cNvCxnSpPr>
+          <p:nvPr/>
+        </p:nvCxnSpPr>
+        <p:spPr>
+          <a:xfrm>
+            <a:off x="5971982" y="4111612"/>
+            <a:ext cx="14886" cy="450635"/>
+          </a:xfrm>
+          <a:prstGeom prst="line">
+            <a:avLst/>
+          </a:prstGeom>
+        </p:spPr>
+        <p:style>
+          <a:lnRef idx="2">
+            <a:schemeClr val="accent1"/>
+          </a:lnRef>
+          <a:fillRef idx="0">
+            <a:schemeClr val="accent1"/>
+          </a:fillRef>
+          <a:effectRef idx="1">
+            <a:schemeClr val="accent1"/>
+          </a:effectRef>
+          <a:fontRef idx="minor">
+            <a:schemeClr val="tx1"/>
+          </a:fontRef>
+        </p:style>
+      </p:cxnSp>
+      <p:cxnSp>
+        <p:nvCxnSpPr>
+          <p:cNvPr id="19" name="Straight Connector 18"/>
+          <p:cNvCxnSpPr>
+            <a:stCxn id="2" idx="2"/>
+            <a:endCxn id="11" idx="0"/>
+          </p:cNvCxnSpPr>
+          <p:nvPr/>
+        </p:nvCxnSpPr>
+        <p:spPr>
+          <a:xfrm flipH="1">
+            <a:off x="5980303" y="4931579"/>
+            <a:ext cx="6565" cy="314535"/>
           </a:xfrm>
           <a:prstGeom prst="line">
             <a:avLst/>

</xml_diff>